<commit_message>
fix mistake in image 3
</commit_message>
<xml_diff>
--- a/example.pptx
+++ b/example.pptx
@@ -1570,7 +1570,7 @@
           </a:ln>
           <a:extLst>
             <a:ext uri="{C572A759-6A51-4108-AA02-DFA0A04FC94B}">
-              <ma14:wrappingTextBoxFlag xmlns:ma14="http://schemas.microsoft.com/office/mac/drawingml/2011/main" xmlns:a14="http://schemas.microsoft.com/office/drawing/2010/main" xmlns:m="http://schemas.openxmlformats.org/officeDocument/2006/math" xmlns="" val="1"/>
+              <ma14:wrappingTextBoxFlag xmlns="" xmlns:m="http://schemas.openxmlformats.org/officeDocument/2006/math" xmlns:a14="http://schemas.microsoft.com/office/drawing/2010/main" xmlns:ma14="http://schemas.microsoft.com/office/mac/drawingml/2011/main" val="1"/>
             </a:ext>
           </a:extLst>
         </p:spPr>
@@ -3895,7 +3895,7 @@
           </a:ln>
           <a:extLst>
             <a:ext uri="{C572A759-6A51-4108-AA02-DFA0A04FC94B}">
-              <ma14:wrappingTextBoxFlag xmlns:ma14="http://schemas.microsoft.com/office/mac/drawingml/2011/main" xmlns:a14="http://schemas.microsoft.com/office/drawing/2010/main" xmlns:m="http://schemas.openxmlformats.org/officeDocument/2006/math" xmlns="" val="1"/>
+              <ma14:wrappingTextBoxFlag xmlns="" xmlns:m="http://schemas.openxmlformats.org/officeDocument/2006/math" xmlns:a14="http://schemas.microsoft.com/office/drawing/2010/main" xmlns:ma14="http://schemas.microsoft.com/office/mac/drawingml/2011/main" val="1"/>
             </a:ext>
           </a:extLst>
         </p:spPr>
@@ -3934,7 +3934,7 @@
           </a:ln>
           <a:extLst>
             <a:ext uri="{C572A759-6A51-4108-AA02-DFA0A04FC94B}">
-              <ma14:wrappingTextBoxFlag xmlns:ma14="http://schemas.microsoft.com/office/mac/drawingml/2011/main" xmlns:a14="http://schemas.microsoft.com/office/drawing/2010/main" xmlns:m="http://schemas.openxmlformats.org/officeDocument/2006/math" xmlns="" val="1"/>
+              <ma14:wrappingTextBoxFlag xmlns="" xmlns:m="http://schemas.openxmlformats.org/officeDocument/2006/math" xmlns:a14="http://schemas.microsoft.com/office/drawing/2010/main" xmlns:ma14="http://schemas.microsoft.com/office/mac/drawingml/2011/main" val="1"/>
             </a:ext>
           </a:extLst>
         </p:spPr>
@@ -4782,7 +4782,7 @@
           </a:ln>
           <a:extLst>
             <a:ext uri="{C572A759-6A51-4108-AA02-DFA0A04FC94B}">
-              <ma14:wrappingTextBoxFlag xmlns:ma14="http://schemas.microsoft.com/office/mac/drawingml/2011/main" xmlns:a14="http://schemas.microsoft.com/office/drawing/2010/main" xmlns:m="http://schemas.openxmlformats.org/officeDocument/2006/math" xmlns="" val="1"/>
+              <ma14:wrappingTextBoxFlag xmlns="" xmlns:m="http://schemas.openxmlformats.org/officeDocument/2006/math" xmlns:a14="http://schemas.microsoft.com/office/drawing/2010/main" xmlns:ma14="http://schemas.microsoft.com/office/mac/drawingml/2011/main" val="1"/>
             </a:ext>
           </a:extLst>
         </p:spPr>
@@ -8063,7 +8063,7 @@
           </a:ln>
           <a:extLst>
             <a:ext uri="{C572A759-6A51-4108-AA02-DFA0A04FC94B}">
-              <ma14:wrappingTextBoxFlag xmlns:ma14="http://schemas.microsoft.com/office/mac/drawingml/2011/main" xmlns:a14="http://schemas.microsoft.com/office/drawing/2010/main" xmlns:m="http://schemas.openxmlformats.org/officeDocument/2006/math" xmlns="" val="1"/>
+              <ma14:wrappingTextBoxFlag xmlns="" xmlns:m="http://schemas.openxmlformats.org/officeDocument/2006/math" xmlns:a14="http://schemas.microsoft.com/office/drawing/2010/main" xmlns:ma14="http://schemas.microsoft.com/office/mac/drawingml/2011/main" val="1"/>
             </a:ext>
           </a:extLst>
         </p:spPr>
@@ -13152,12 +13152,8 @@
           <a:lstStyle/>
           <a:p>
             <a:r>
-              <a:rPr lang="de-DE" b="1" dirty="0" err="1"/>
-              <a:t>Message.byte</a:t>
-            </a:r>
-            <a:r>
               <a:rPr lang="de-DE" b="1" dirty="0"/>
-              <a:t>(6) = </a:t>
+              <a:t>Message.byte(6) = </a:t>
             </a:r>
             <a:r>
               <a:rPr lang="de-DE" sz="2400" b="1" dirty="0">
@@ -13331,7 +13327,7 @@
           </a:ln>
           <a:extLst>
             <a:ext uri="{C572A759-6A51-4108-AA02-DFA0A04FC94B}">
-              <ma14:wrappingTextBoxFlag xmlns:ma14="http://schemas.microsoft.com/office/mac/drawingml/2011/main" xmlns:a14="http://schemas.microsoft.com/office/drawing/2010/main" xmlns:m="http://schemas.openxmlformats.org/officeDocument/2006/math" xmlns="" val="1"/>
+              <ma14:wrappingTextBoxFlag xmlns="" xmlns:m="http://schemas.openxmlformats.org/officeDocument/2006/math" xmlns:a14="http://schemas.microsoft.com/office/drawing/2010/main" xmlns:ma14="http://schemas.microsoft.com/office/mac/drawingml/2011/main" val="1"/>
             </a:ext>
           </a:extLst>
         </p:spPr>
@@ -14768,7 +14764,7 @@
           <p:nvPr>
             <p:extLst>
               <p:ext uri="{D42A27DB-BD31-4B8C-83A1-F6EECF244321}">
-                <p14:modId xmlns:p14="http://schemas.microsoft.com/office/powerpoint/2010/main" val="585323422"/>
+                <p14:modId xmlns:p14="http://schemas.microsoft.com/office/powerpoint/2010/main" val="1684995379"/>
               </p:ext>
             </p:extLst>
           </p:nvPr>
@@ -14867,7 +14863,7 @@
                             </a:schemeClr>
                           </a:solidFill>
                         </a:rPr>
-                        <a:t>Byte 4</a:t>
+                        <a:t>New</a:t>
                       </a:r>
                     </a:p>
                   </a:txBody>
@@ -15694,12 +15690,8 @@
           <a:lstStyle/>
           <a:p>
             <a:r>
-              <a:rPr lang="de-DE" b="1" dirty="0" err="1"/>
-              <a:t>Message.byte</a:t>
-            </a:r>
-            <a:r>
               <a:rPr lang="de-DE" b="1" dirty="0"/>
-              <a:t>(7) = </a:t>
+              <a:t>Message.byte(7) = </a:t>
             </a:r>
             <a:r>
               <a:rPr lang="de-DE" sz="2400" b="1" dirty="0">

</xml_diff>

<commit_message>
fix factor offset different between CAN Benz uund J1939
</commit_message>
<xml_diff>
--- a/example.pptx
+++ b/example.pptx
@@ -1570,7 +1570,7 @@
           </a:ln>
           <a:extLst>
             <a:ext uri="{C572A759-6A51-4108-AA02-DFA0A04FC94B}">
-              <ma14:wrappingTextBoxFlag xmlns="" xmlns:m="http://schemas.openxmlformats.org/officeDocument/2006/math" xmlns:a14="http://schemas.microsoft.com/office/drawing/2010/main" xmlns:ma14="http://schemas.microsoft.com/office/mac/drawingml/2011/main" val="1"/>
+              <ma14:wrappingTextBoxFlag xmlns:ma14="http://schemas.microsoft.com/office/mac/drawingml/2011/main" xmlns:a14="http://schemas.microsoft.com/office/drawing/2010/main" xmlns:m="http://schemas.openxmlformats.org/officeDocument/2006/math" xmlns="" val="1"/>
             </a:ext>
           </a:extLst>
         </p:spPr>
@@ -3895,7 +3895,7 @@
           </a:ln>
           <a:extLst>
             <a:ext uri="{C572A759-6A51-4108-AA02-DFA0A04FC94B}">
-              <ma14:wrappingTextBoxFlag xmlns="" xmlns:m="http://schemas.openxmlformats.org/officeDocument/2006/math" xmlns:a14="http://schemas.microsoft.com/office/drawing/2010/main" xmlns:ma14="http://schemas.microsoft.com/office/mac/drawingml/2011/main" val="1"/>
+              <ma14:wrappingTextBoxFlag xmlns:ma14="http://schemas.microsoft.com/office/mac/drawingml/2011/main" xmlns:a14="http://schemas.microsoft.com/office/drawing/2010/main" xmlns:m="http://schemas.openxmlformats.org/officeDocument/2006/math" xmlns="" val="1"/>
             </a:ext>
           </a:extLst>
         </p:spPr>
@@ -3934,7 +3934,7 @@
           </a:ln>
           <a:extLst>
             <a:ext uri="{C572A759-6A51-4108-AA02-DFA0A04FC94B}">
-              <ma14:wrappingTextBoxFlag xmlns="" xmlns:m="http://schemas.openxmlformats.org/officeDocument/2006/math" xmlns:a14="http://schemas.microsoft.com/office/drawing/2010/main" xmlns:ma14="http://schemas.microsoft.com/office/mac/drawingml/2011/main" val="1"/>
+              <ma14:wrappingTextBoxFlag xmlns:ma14="http://schemas.microsoft.com/office/mac/drawingml/2011/main" xmlns:a14="http://schemas.microsoft.com/office/drawing/2010/main" xmlns:m="http://schemas.openxmlformats.org/officeDocument/2006/math" xmlns="" val="1"/>
             </a:ext>
           </a:extLst>
         </p:spPr>
@@ -4782,7 +4782,7 @@
           </a:ln>
           <a:extLst>
             <a:ext uri="{C572A759-6A51-4108-AA02-DFA0A04FC94B}">
-              <ma14:wrappingTextBoxFlag xmlns="" xmlns:m="http://schemas.openxmlformats.org/officeDocument/2006/math" xmlns:a14="http://schemas.microsoft.com/office/drawing/2010/main" xmlns:ma14="http://schemas.microsoft.com/office/mac/drawingml/2011/main" val="1"/>
+              <ma14:wrappingTextBoxFlag xmlns:ma14="http://schemas.microsoft.com/office/mac/drawingml/2011/main" xmlns:a14="http://schemas.microsoft.com/office/drawing/2010/main" xmlns:m="http://schemas.openxmlformats.org/officeDocument/2006/math" xmlns="" val="1"/>
             </a:ext>
           </a:extLst>
         </p:spPr>
@@ -8063,7 +8063,7 @@
           </a:ln>
           <a:extLst>
             <a:ext uri="{C572A759-6A51-4108-AA02-DFA0A04FC94B}">
-              <ma14:wrappingTextBoxFlag xmlns="" xmlns:m="http://schemas.openxmlformats.org/officeDocument/2006/math" xmlns:a14="http://schemas.microsoft.com/office/drawing/2010/main" xmlns:ma14="http://schemas.microsoft.com/office/mac/drawingml/2011/main" val="1"/>
+              <ma14:wrappingTextBoxFlag xmlns:ma14="http://schemas.microsoft.com/office/mac/drawingml/2011/main" xmlns:a14="http://schemas.microsoft.com/office/drawing/2010/main" xmlns:m="http://schemas.openxmlformats.org/officeDocument/2006/math" xmlns="" val="1"/>
             </a:ext>
           </a:extLst>
         </p:spPr>
@@ -13327,7 +13327,7 @@
           </a:ln>
           <a:extLst>
             <a:ext uri="{C572A759-6A51-4108-AA02-DFA0A04FC94B}">
-              <ma14:wrappingTextBoxFlag xmlns="" xmlns:m="http://schemas.openxmlformats.org/officeDocument/2006/math" xmlns:a14="http://schemas.microsoft.com/office/drawing/2010/main" xmlns:ma14="http://schemas.microsoft.com/office/mac/drawingml/2011/main" val="1"/>
+              <ma14:wrappingTextBoxFlag xmlns:ma14="http://schemas.microsoft.com/office/mac/drawingml/2011/main" xmlns:a14="http://schemas.microsoft.com/office/drawing/2010/main" xmlns:m="http://schemas.openxmlformats.org/officeDocument/2006/math" xmlns="" val="1"/>
             </a:ext>
           </a:extLst>
         </p:spPr>

</xml_diff>